<commit_message>
quick review / updates to files for responses to Q1/Q2
</commit_message>
<xml_diff>
--- a/rh_prob_solve_q1_answer.pptx
+++ b/rh_prob_solve_q1_answer.pptx
@@ -16790,11 +16790,7 @@
             <a:pPr lvl="0"/>
             <a:r>
               <a:rPr lang="en-US" dirty="0" smtClean="0"/>
-              <a:t>Adjust resources as </a:t>
-            </a:r>
-            <a:r>
-              <a:rPr lang="en-US" dirty="0" smtClean="0"/>
-              <a:t>needed</a:t>
+              <a:t>Adjust resources as needed</a:t>
             </a:r>
           </a:p>
           <a:p>
@@ -16810,7 +16806,6 @@
               <a:rPr lang="en-US" dirty="0" smtClean="0"/>
               <a:t>Permissions, open ports, setup apps</a:t>
             </a:r>
-            <a:endParaRPr lang="en-US" dirty="0" smtClean="0"/>
           </a:p>
           <a:p>
             <a:pPr lvl="0"/>
@@ -17492,7 +17487,11 @@
             <a:pPr lvl="1"/>
             <a:r>
               <a:rPr lang="en-US" dirty="0" smtClean="0"/>
-              <a:t>Move to modern development apps</a:t>
+              <a:t>Move to modern development </a:t>
+            </a:r>
+            <a:r>
+              <a:rPr lang="en-US" dirty="0" smtClean="0"/>
+              <a:t>apps</a:t>
             </a:r>
           </a:p>
           <a:p>
@@ -17647,13 +17646,8 @@
           <a:p>
             <a:r>
               <a:rPr lang="en-US" dirty="0" smtClean="0"/>
-              <a:t>Sample </a:t>
-            </a:r>
-            <a:r>
-              <a:rPr lang="en-US" dirty="0" smtClean="0"/>
-              <a:t>App</a:t>
-            </a:r>
-            <a:endParaRPr lang="en-US" dirty="0" smtClean="0"/>
+              <a:t>Sample App</a:t>
+            </a:r>
           </a:p>
           <a:p>
             <a:pPr lvl="1"/>
@@ -17661,17 +17655,12 @@
               <a:rPr lang="en-US" dirty="0" smtClean="0"/>
               <a:t>Download repo</a:t>
             </a:r>
-            <a:endParaRPr lang="en-US" dirty="0" smtClean="0"/>
           </a:p>
           <a:p>
             <a:pPr lvl="1"/>
             <a:r>
               <a:rPr lang="en-US" dirty="0" smtClean="0"/>
-              <a:t>Run </a:t>
-            </a:r>
-            <a:r>
-              <a:rPr lang="en-US" dirty="0" smtClean="0"/>
-              <a:t>containers</a:t>
+              <a:t>Run containers</a:t>
             </a:r>
           </a:p>
           <a:p>
@@ -17691,7 +17680,6 @@
               <a:rPr lang="en-US" dirty="0" smtClean="0"/>
               <a:t>Db</a:t>
             </a:r>
-            <a:endParaRPr lang="en-US" dirty="0" smtClean="0"/>
           </a:p>
           <a:p>
             <a:pPr lvl="1"/>
@@ -17707,7 +17695,6 @@
               <a:rPr lang="en-US" dirty="0" smtClean="0"/>
               <a:t> web</a:t>
             </a:r>
-            <a:endParaRPr lang="en-US" dirty="0" smtClean="0"/>
           </a:p>
           <a:p>
             <a:pPr lvl="1"/>
@@ -17715,7 +17702,6 @@
               <a:rPr lang="en-US" dirty="0" smtClean="0"/>
               <a:t>Update DB</a:t>
             </a:r>
-            <a:endParaRPr lang="en-US" dirty="0" smtClean="0"/>
           </a:p>
           <a:p>
             <a:pPr lvl="1"/>
@@ -17728,11 +17714,7 @@
             <a:pPr lvl="1"/>
             <a:r>
               <a:rPr lang="en-US" dirty="0" smtClean="0"/>
-              <a:t>Check the DB </a:t>
-            </a:r>
-            <a:r>
-              <a:rPr lang="en-US" dirty="0" smtClean="0"/>
-              <a:t>files</a:t>
+              <a:t>Check the DB files</a:t>
             </a:r>
           </a:p>
           <a:p>

</xml_diff>